<commit_message>
Updated the main powerpoint and added a PG version
</commit_message>
<xml_diff>
--- a/IntroductionToGameDesign.pptx
+++ b/IntroductionToGameDesign.pptx
@@ -10,7 +10,7 @@
   </p:notesMasterIdLst>
   <p:sldIdLst>
     <p:sldId id="275" r:id="rId3"/>
-    <p:sldId id="302" r:id="rId4"/>
+    <p:sldId id="304" r:id="rId4"/>
     <p:sldId id="257" r:id="rId5"/>
     <p:sldId id="301" r:id="rId6"/>
     <p:sldId id="277" r:id="rId7"/>
@@ -40,7 +40,7 @@
     <p:sldId id="299" r:id="rId31"/>
     <p:sldId id="300" r:id="rId32"/>
     <p:sldId id="269" r:id="rId33"/>
-    <p:sldId id="303" r:id="rId34"/>
+    <p:sldId id="305" r:id="rId34"/>
   </p:sldIdLst>
   <p:sldSz cx="9144000" cy="6858000" type="screen4x3"/>
   <p:notesSz cx="6858000" cy="9144000"/>
@@ -240,7 +240,7 @@
           <a:p>
             <a:fld id="{8DB45967-1B43-4F83-89D2-C7D1F1F163A7}" type="datetimeFigureOut">
               <a:rPr lang="en-US" smtClean="0"/>
-              <a:t>8/17/2016</a:t>
+              <a:t>5/31/2017</a:t>
             </a:fld>
             <a:endParaRPr lang="en-US"/>
           </a:p>
@@ -895,7 +895,7 @@
           <a:p>
             <a:fld id="{E8483DF2-31D8-4093-9C85-11B3A24D2258}" type="datetimeFigureOut">
               <a:rPr lang="en-US" smtClean="0"/>
-              <a:t>8/17/2016</a:t>
+              <a:t>5/31/2017</a:t>
             </a:fld>
             <a:endParaRPr lang="en-US"/>
           </a:p>
@@ -1127,7 +1127,7 @@
           <a:p>
             <a:fld id="{E8483DF2-31D8-4093-9C85-11B3A24D2258}" type="datetimeFigureOut">
               <a:rPr lang="en-US" smtClean="0"/>
-              <a:t>8/17/2016</a:t>
+              <a:t>5/31/2017</a:t>
             </a:fld>
             <a:endParaRPr lang="en-US"/>
           </a:p>
@@ -1494,7 +1494,7 @@
           <a:p>
             <a:fld id="{E8483DF2-31D8-4093-9C85-11B3A24D2258}" type="datetimeFigureOut">
               <a:rPr lang="en-US" smtClean="0"/>
-              <a:t>8/17/2016</a:t>
+              <a:t>5/31/2017</a:t>
             </a:fld>
             <a:endParaRPr lang="en-US"/>
           </a:p>
@@ -1612,7 +1612,7 @@
           <a:p>
             <a:fld id="{E8483DF2-31D8-4093-9C85-11B3A24D2258}" type="datetimeFigureOut">
               <a:rPr lang="en-US" smtClean="0"/>
-              <a:t>8/17/2016</a:t>
+              <a:t>5/31/2017</a:t>
             </a:fld>
             <a:endParaRPr lang="en-US"/>
           </a:p>
@@ -1707,7 +1707,7 @@
           <a:p>
             <a:fld id="{E8483DF2-31D8-4093-9C85-11B3A24D2258}" type="datetimeFigureOut">
               <a:rPr lang="en-US" smtClean="0"/>
-              <a:t>8/17/2016</a:t>
+              <a:t>5/31/2017</a:t>
             </a:fld>
             <a:endParaRPr lang="en-US"/>
           </a:p>
@@ -1984,7 +1984,7 @@
           <a:p>
             <a:fld id="{E8483DF2-31D8-4093-9C85-11B3A24D2258}" type="datetimeFigureOut">
               <a:rPr lang="en-US" smtClean="0"/>
-              <a:t>8/17/2016</a:t>
+              <a:t>5/31/2017</a:t>
             </a:fld>
             <a:endParaRPr lang="en-US"/>
           </a:p>
@@ -2237,7 +2237,7 @@
           <a:p>
             <a:fld id="{E8483DF2-31D8-4093-9C85-11B3A24D2258}" type="datetimeFigureOut">
               <a:rPr lang="en-US" smtClean="0"/>
-              <a:t>8/17/2016</a:t>
+              <a:t>5/31/2017</a:t>
             </a:fld>
             <a:endParaRPr lang="en-US"/>
           </a:p>
@@ -2407,7 +2407,7 @@
           <a:p>
             <a:fld id="{E8483DF2-31D8-4093-9C85-11B3A24D2258}" type="datetimeFigureOut">
               <a:rPr lang="en-US" smtClean="0"/>
-              <a:t>8/17/2016</a:t>
+              <a:t>5/31/2017</a:t>
             </a:fld>
             <a:endParaRPr lang="en-US"/>
           </a:p>
@@ -2587,7 +2587,7 @@
           <a:p>
             <a:fld id="{E8483DF2-31D8-4093-9C85-11B3A24D2258}" type="datetimeFigureOut">
               <a:rPr lang="en-US" smtClean="0"/>
-              <a:t>8/17/2016</a:t>
+              <a:t>5/31/2017</a:t>
             </a:fld>
             <a:endParaRPr lang="en-US"/>
           </a:p>
@@ -4034,7 +4034,7 @@
           <a:p>
             <a:fld id="{E8483DF2-31D8-4093-9C85-11B3A24D2258}" type="datetimeFigureOut">
               <a:rPr lang="en-US" smtClean="0"/>
-              <a:t>8/17/2016</a:t>
+              <a:t>5/31/2017</a:t>
             </a:fld>
             <a:endParaRPr lang="en-US"/>
           </a:p>
@@ -4204,7 +4204,7 @@
           <a:p>
             <a:fld id="{E8483DF2-31D8-4093-9C85-11B3A24D2258}" type="datetimeFigureOut">
               <a:rPr lang="en-US" smtClean="0"/>
-              <a:t>8/17/2016</a:t>
+              <a:t>5/31/2017</a:t>
             </a:fld>
             <a:endParaRPr lang="en-US"/>
           </a:p>
@@ -4854,7 +4854,7 @@
           <a:p>
             <a:fld id="{E8483DF2-31D8-4093-9C85-11B3A24D2258}" type="datetimeFigureOut">
               <a:rPr lang="en-US" smtClean="0"/>
-              <a:t>8/17/2016</a:t>
+              <a:t>5/31/2017</a:t>
             </a:fld>
             <a:endParaRPr lang="en-US"/>
           </a:p>
@@ -6526,19 +6526,21 @@
             <a:pPr lvl="1"/>
             <a:r>
               <a:rPr lang="en-US" dirty="0" smtClean="0"/>
-              <a:t>Developer – </a:t>
-            </a:r>
-            <a:r>
-              <a:rPr lang="en-US" dirty="0" err="1" smtClean="0"/>
-              <a:t>CareEvolution</a:t>
-            </a:r>
-            <a:endParaRPr lang="en-US" dirty="0" smtClean="0"/>
+              <a:t>Chairman – DevSpace Technical Conference</a:t>
+            </a:r>
           </a:p>
           <a:p>
             <a:pPr lvl="1"/>
             <a:r>
               <a:rPr lang="en-US" dirty="0" smtClean="0"/>
-              <a:t>Chairman – DevSpace Technical Conference</a:t>
+              <a:t>Sr. Software Engineer – Trainer Road</a:t>
+            </a:r>
+          </a:p>
+          <a:p>
+            <a:pPr lvl="1"/>
+            <a:r>
+              <a:rPr lang="en-US" dirty="0" smtClean="0"/>
+              <a:t>Microsoft MVP – VS &amp; Dev Technologies</a:t>
             </a:r>
           </a:p>
           <a:p>
@@ -6553,7 +6555,7 @@
       </p:sp>
       <p:pic>
         <p:nvPicPr>
-          <p:cNvPr id="4" name="Picture 3"/>
+          <p:cNvPr id="5" name="Picture 4"/>
           <p:cNvPicPr>
             <a:picLocks noChangeAspect="1"/>
           </p:cNvPicPr>
@@ -6573,37 +6575,7 @@
         </p:blipFill>
         <p:spPr>
           <a:xfrm>
-            <a:off x="5755210" y="2125266"/>
-            <a:ext cx="2760140" cy="498172"/>
-          </a:xfrm>
-          <a:prstGeom prst="rect">
-            <a:avLst/>
-          </a:prstGeom>
-        </p:spPr>
-      </p:pic>
-      <p:pic>
-        <p:nvPicPr>
-          <p:cNvPr id="5" name="Picture 4"/>
-          <p:cNvPicPr>
-            <a:picLocks noChangeAspect="1"/>
-          </p:cNvPicPr>
-          <p:nvPr/>
-        </p:nvPicPr>
-        <p:blipFill>
-          <a:blip r:embed="rId3">
-            <a:extLst>
-              <a:ext uri="{28A0092B-C50C-407E-A947-70E740481C1C}">
-                <a14:useLocalDpi xmlns:a14="http://schemas.microsoft.com/office/drawing/2010/main" val="0"/>
-              </a:ext>
-            </a:extLst>
-          </a:blip>
-          <a:stretch>
-            <a:fillRect/>
-          </a:stretch>
-        </p:blipFill>
-        <p:spPr>
-          <a:xfrm>
-            <a:off x="5466379" y="3437146"/>
+            <a:off x="5466379" y="2226469"/>
             <a:ext cx="3048971" cy="2052827"/>
           </a:xfrm>
           <a:prstGeom prst="rect">
@@ -6620,7 +6592,7 @@
           <p:nvPr/>
         </p:nvPicPr>
         <p:blipFill>
-          <a:blip r:embed="rId4" cstate="print">
+          <a:blip r:embed="rId3" cstate="print">
             <a:extLst>
               <a:ext uri="{28A0092B-C50C-407E-A947-70E740481C1C}">
                 <a14:useLocalDpi xmlns:a14="http://schemas.microsoft.com/office/drawing/2010/main" val="0"/>
@@ -6633,8 +6605,68 @@
         </p:blipFill>
         <p:spPr>
           <a:xfrm>
-            <a:off x="628651" y="3814331"/>
-            <a:ext cx="2553467" cy="1675642"/>
+            <a:off x="6509401" y="4513378"/>
+            <a:ext cx="2005949" cy="1316348"/>
+          </a:xfrm>
+          <a:prstGeom prst="rect">
+            <a:avLst/>
+          </a:prstGeom>
+        </p:spPr>
+      </p:pic>
+      <p:pic>
+        <p:nvPicPr>
+          <p:cNvPr id="7" name="Picture 6"/>
+          <p:cNvPicPr>
+            <a:picLocks noChangeAspect="1"/>
+          </p:cNvPicPr>
+          <p:nvPr/>
+        </p:nvPicPr>
+        <p:blipFill>
+          <a:blip r:embed="rId4">
+            <a:extLst>
+              <a:ext uri="{28A0092B-C50C-407E-A947-70E740481C1C}">
+                <a14:useLocalDpi xmlns:a14="http://schemas.microsoft.com/office/drawing/2010/main" val="0"/>
+              </a:ext>
+            </a:extLst>
+          </a:blip>
+          <a:stretch>
+            <a:fillRect/>
+          </a:stretch>
+        </p:blipFill>
+        <p:spPr>
+          <a:xfrm>
+            <a:off x="445583" y="4827031"/>
+            <a:ext cx="3268022" cy="690851"/>
+          </a:xfrm>
+          <a:prstGeom prst="rect">
+            <a:avLst/>
+          </a:prstGeom>
+        </p:spPr>
+      </p:pic>
+      <p:pic>
+        <p:nvPicPr>
+          <p:cNvPr id="8" name="Picture 7"/>
+          <p:cNvPicPr>
+            <a:picLocks noChangeAspect="1"/>
+          </p:cNvPicPr>
+          <p:nvPr/>
+        </p:nvPicPr>
+        <p:blipFill>
+          <a:blip r:embed="rId5" cstate="print">
+            <a:extLst>
+              <a:ext uri="{28A0092B-C50C-407E-A947-70E740481C1C}">
+                <a14:useLocalDpi xmlns:a14="http://schemas.microsoft.com/office/drawing/2010/main" val="0"/>
+              </a:ext>
+            </a:extLst>
+          </a:blip>
+          <a:stretch>
+            <a:fillRect/>
+          </a:stretch>
+        </p:blipFill>
+        <p:spPr>
+          <a:xfrm>
+            <a:off x="4253109" y="4825222"/>
+            <a:ext cx="1716790" cy="692660"/>
           </a:xfrm>
           <a:prstGeom prst="rect">
             <a:avLst/>
@@ -6644,13 +6676,20 @@
     </p:spTree>
     <p:extLst>
       <p:ext uri="{BB962C8B-B14F-4D97-AF65-F5344CB8AC3E}">
-        <p14:creationId xmlns:p14="http://schemas.microsoft.com/office/powerpoint/2010/main" val="2691510342"/>
+        <p14:creationId xmlns:p14="http://schemas.microsoft.com/office/powerpoint/2010/main" val="213068580"/>
       </p:ext>
     </p:extLst>
   </p:cSld>
   <p:clrMapOvr>
     <a:masterClrMapping/>
   </p:clrMapOvr>
+  <p:timing>
+    <p:tnLst>
+      <p:par>
+        <p:cTn id="1" dur="indefinite" restart="never" nodeType="tmRoot"/>
+      </p:par>
+    </p:tnLst>
+  </p:timing>
 </p:sld>
 </file>
 
@@ -8184,131 +8223,21 @@
           <a:p>
             <a:r>
               <a:rPr lang="en-US" dirty="0" smtClean="0"/>
-              <a:t>Thank You!</a:t>
+              <a:t>Thank You</a:t>
             </a:r>
             <a:endParaRPr lang="en-US" dirty="0"/>
-          </a:p>
-        </p:txBody>
-      </p:sp>
-      <p:sp>
-        <p:nvSpPr>
-          <p:cNvPr id="3" name="Content Placeholder 2"/>
-          <p:cNvSpPr>
-            <a:spLocks noGrp="1"/>
-          </p:cNvSpPr>
-          <p:nvPr>
-            <p:ph idx="1"/>
-          </p:nvPr>
-        </p:nvSpPr>
-        <p:spPr/>
-        <p:txBody>
-          <a:bodyPr>
-            <a:normAutofit/>
-          </a:bodyPr>
-          <a:lstStyle/>
-          <a:p>
-            <a:r>
-              <a:rPr lang="en-US" dirty="0" smtClean="0"/>
-              <a:t>Contact Info</a:t>
-            </a:r>
-          </a:p>
-          <a:p>
-            <a:pPr lvl="1"/>
-            <a:r>
-              <a:rPr lang="en-US" dirty="0" smtClean="0"/>
-              <a:t>Personal</a:t>
-            </a:r>
-          </a:p>
-          <a:p>
-            <a:pPr lvl="2"/>
-            <a:r>
-              <a:rPr lang="en-US" dirty="0" smtClean="0"/>
-              <a:t>@</a:t>
-            </a:r>
-            <a:r>
-              <a:rPr lang="en-US" dirty="0" err="1" smtClean="0"/>
-              <a:t>freestylecoder</a:t>
-            </a:r>
-            <a:endParaRPr lang="en-US" dirty="0" smtClean="0"/>
-          </a:p>
-          <a:p>
-            <a:pPr lvl="2"/>
-            <a:r>
-              <a:rPr lang="en-US" dirty="0" smtClean="0"/>
-              <a:t>cgardner@gmail.com</a:t>
-            </a:r>
-          </a:p>
-          <a:p>
-            <a:pPr lvl="1"/>
-            <a:r>
-              <a:rPr lang="en-US" dirty="0" smtClean="0"/>
-              <a:t>Professional</a:t>
-            </a:r>
-          </a:p>
-          <a:p>
-            <a:pPr lvl="2"/>
-            <a:r>
-              <a:rPr lang="en-US" dirty="0"/>
-              <a:t>l</a:t>
-            </a:r>
-            <a:r>
-              <a:rPr lang="en-US" dirty="0" smtClean="0"/>
-              <a:t>etsfixhealthcare.com</a:t>
-            </a:r>
-          </a:p>
-          <a:p>
-            <a:pPr lvl="2"/>
-            <a:r>
-              <a:rPr lang="en-US" dirty="0" smtClean="0"/>
-              <a:t>cgardner@careevolution.com</a:t>
-            </a:r>
-          </a:p>
-          <a:p>
-            <a:pPr lvl="1"/>
-            <a:r>
-              <a:rPr lang="en-US" dirty="0" smtClean="0"/>
-              <a:t>DevSpace</a:t>
-            </a:r>
-          </a:p>
-          <a:p>
-            <a:pPr lvl="2"/>
-            <a:r>
-              <a:rPr lang="en-US" dirty="0" smtClean="0"/>
-              <a:t>@</a:t>
-            </a:r>
-            <a:r>
-              <a:rPr lang="en-US" dirty="0" err="1" smtClean="0"/>
-              <a:t>devspaceconf</a:t>
-            </a:r>
-            <a:endParaRPr lang="en-US" dirty="0" smtClean="0"/>
-          </a:p>
-          <a:p>
-            <a:pPr lvl="2"/>
-            <a:r>
-              <a:rPr lang="en-US" dirty="0" smtClean="0"/>
-              <a:t>devspaceconf.com</a:t>
-            </a:r>
-          </a:p>
-          <a:p>
-            <a:pPr lvl="2"/>
-            <a:r>
-              <a:rPr lang="en-US" dirty="0" smtClean="0"/>
-              <a:t>cgardner@devspaceconf.com</a:t>
-            </a:r>
-          </a:p>
-          <a:p>
-            <a:pPr lvl="2"/>
-            <a:endParaRPr lang="en-US" dirty="0" smtClean="0"/>
           </a:p>
         </p:txBody>
       </p:sp>
       <p:pic>
         <p:nvPicPr>
-          <p:cNvPr id="4" name="Picture 3"/>
+          <p:cNvPr id="1026" name="Picture 2" descr="wpid-img_3278.jpg"/>
           <p:cNvPicPr>
-            <a:picLocks noChangeAspect="1"/>
+            <a:picLocks noGrp="1" noChangeAspect="1" noChangeArrowheads="1"/>
           </p:cNvPicPr>
-          <p:nvPr/>
+          <p:nvPr>
+            <p:ph idx="1"/>
+          </p:nvPr>
         </p:nvPicPr>
         <p:blipFill>
           <a:blip r:embed="rId2">
@@ -8318,30 +8247,41 @@
               </a:ext>
             </a:extLst>
           </a:blip>
+          <a:srcRect/>
           <a:stretch>
             <a:fillRect/>
           </a:stretch>
         </p:blipFill>
-        <p:spPr>
+        <p:spPr bwMode="auto">
           <a:xfrm>
-            <a:off x="4876800" y="1690689"/>
-            <a:ext cx="3152556" cy="3152556"/>
+            <a:off x="5693779" y="2125266"/>
+            <a:ext cx="2821571" cy="3263504"/>
           </a:xfrm>
           <a:prstGeom prst="rect">
             <a:avLst/>
           </a:prstGeom>
+          <a:noFill/>
+          <a:extLst>
+            <a:ext uri="{909E8E84-426E-40DD-AFC4-6F175D3DCCD1}">
+              <a14:hiddenFill xmlns:a14="http://schemas.microsoft.com/office/drawing/2010/main">
+                <a:solidFill>
+                  <a:srgbClr val="FFFFFF"/>
+                </a:solidFill>
+              </a14:hiddenFill>
+            </a:ext>
+          </a:extLst>
         </p:spPr>
       </p:pic>
       <p:sp>
         <p:nvSpPr>
-          <p:cNvPr id="5" name="TextBox 4"/>
+          <p:cNvPr id="4" name="TextBox 3"/>
           <p:cNvSpPr txBox="1"/>
           <p:nvPr/>
         </p:nvSpPr>
         <p:spPr>
           <a:xfrm>
-            <a:off x="4876800" y="5325438"/>
-            <a:ext cx="3152556" cy="507831"/>
+            <a:off x="628650" y="2125267"/>
+            <a:ext cx="5065130" cy="2723823"/>
           </a:xfrm>
           <a:prstGeom prst="rect">
             <a:avLst/>
@@ -8354,25 +8294,151 @@
           </a:bodyPr>
           <a:lstStyle/>
           <a:p>
-            <a:pPr algn="ctr"/>
-            <a:r>
-              <a:rPr lang="en-US" sz="2700" dirty="0" smtClean="0"/>
-              <a:t>http://bit.ly/2aZZcL6</a:t>
-            </a:r>
-            <a:endParaRPr lang="en-US" sz="2700" dirty="0"/>
+            <a:r>
+              <a:rPr lang="en-US" sz="2100" dirty="0"/>
+              <a:t>Chris Gardner</a:t>
+            </a:r>
+          </a:p>
+          <a:p>
+            <a:pPr marL="214313" indent="-214313">
+              <a:buFont typeface="Arial" panose="020B0604020202020204" pitchFamily="34" charset="0"/>
+              <a:buChar char="•"/>
+            </a:pPr>
+            <a:r>
+              <a:rPr lang="en-US" dirty="0"/>
+              <a:t>@</a:t>
+            </a:r>
+            <a:r>
+              <a:rPr lang="en-US" dirty="0" err="1"/>
+              <a:t>freestylecoder</a:t>
+            </a:r>
+            <a:endParaRPr lang="en-US" dirty="0"/>
+          </a:p>
+          <a:p>
+            <a:pPr marL="214313" indent="-214313">
+              <a:buFont typeface="Arial" panose="020B0604020202020204" pitchFamily="34" charset="0"/>
+              <a:buChar char="•"/>
+            </a:pPr>
+            <a:r>
+              <a:rPr lang="en-US" dirty="0"/>
+              <a:t>cgardner@gmail.com</a:t>
+            </a:r>
+          </a:p>
+          <a:p>
+            <a:pPr marL="214313" indent="-214313">
+              <a:buFont typeface="Arial" panose="020B0604020202020204" pitchFamily="34" charset="0"/>
+              <a:buChar char="•"/>
+            </a:pPr>
+            <a:r>
+              <a:rPr lang="en-US" dirty="0"/>
+              <a:t>github.com/</a:t>
+            </a:r>
+            <a:r>
+              <a:rPr lang="en-US" dirty="0" err="1"/>
+              <a:t>freestylecoder</a:t>
+            </a:r>
+            <a:endParaRPr lang="en-US" dirty="0"/>
+          </a:p>
+          <a:p>
+            <a:endParaRPr lang="en-US" sz="2100" dirty="0"/>
+          </a:p>
+          <a:p>
+            <a:r>
+              <a:rPr lang="en-US" sz="2100" dirty="0"/>
+              <a:t>DevSpace Technical Conference</a:t>
+            </a:r>
+          </a:p>
+          <a:p>
+            <a:pPr marL="214313" indent="-214313">
+              <a:buFont typeface="Arial" panose="020B0604020202020204" pitchFamily="34" charset="0"/>
+              <a:buChar char="•"/>
+            </a:pPr>
+            <a:r>
+              <a:rPr lang="en-US" dirty="0"/>
+              <a:t>@</a:t>
+            </a:r>
+            <a:r>
+              <a:rPr lang="en-US" dirty="0" err="1"/>
+              <a:t>devspaceconf</a:t>
+            </a:r>
+            <a:endParaRPr lang="en-US" dirty="0"/>
+          </a:p>
+          <a:p>
+            <a:pPr marL="214313" indent="-214313">
+              <a:buFont typeface="Arial" panose="020B0604020202020204" pitchFamily="34" charset="0"/>
+              <a:buChar char="•"/>
+            </a:pPr>
+            <a:r>
+              <a:rPr lang="en-US" dirty="0"/>
+              <a:t>info@devspaceconf.com</a:t>
+            </a:r>
+          </a:p>
+          <a:p>
+            <a:pPr marL="214313" indent="-214313">
+              <a:buFont typeface="Arial" panose="020B0604020202020204" pitchFamily="34" charset="0"/>
+              <a:buChar char="•"/>
+            </a:pPr>
+            <a:r>
+              <a:rPr lang="en-US" dirty="0"/>
+              <a:t>https://www.devspaceconf.com</a:t>
+            </a:r>
+            <a:endParaRPr lang="en-US" dirty="0"/>
+          </a:p>
+        </p:txBody>
+      </p:sp>
+      <p:sp>
+        <p:nvSpPr>
+          <p:cNvPr id="5" name="TextBox 4"/>
+          <p:cNvSpPr txBox="1"/>
+          <p:nvPr/>
+        </p:nvSpPr>
+        <p:spPr>
+          <a:xfrm>
+            <a:off x="0" y="6581001"/>
+            <a:ext cx="3363421" cy="276999"/>
+          </a:xfrm>
+          <a:prstGeom prst="rect">
+            <a:avLst/>
+          </a:prstGeom>
+          <a:noFill/>
+        </p:spPr>
+        <p:txBody>
+          <a:bodyPr wrap="none" rtlCol="0">
+            <a:spAutoFit/>
+          </a:bodyPr>
+          <a:lstStyle/>
+          <a:p>
+            <a:r>
+              <a:rPr lang="en-US" sz="600" dirty="0"/>
+              <a:t>Page Source: https://jaseandjax.wordpress.com/2014/05/06/no-one-expects-the-spanish-inquisition/</a:t>
+            </a:r>
+          </a:p>
+          <a:p>
+            <a:r>
+              <a:rPr lang="en-US" sz="600" dirty="0"/>
+              <a:t>Image Source: https://jaseandjax.files.wordpress.com/2014/05/wpid-img_3278.jpg?w=545</a:t>
+            </a:r>
+            <a:endParaRPr lang="en-US" sz="600" dirty="0"/>
           </a:p>
         </p:txBody>
       </p:sp>
     </p:spTree>
     <p:extLst>
       <p:ext uri="{BB962C8B-B14F-4D97-AF65-F5344CB8AC3E}">
-        <p14:creationId xmlns:p14="http://schemas.microsoft.com/office/powerpoint/2010/main" val="549229425"/>
+        <p14:creationId xmlns:p14="http://schemas.microsoft.com/office/powerpoint/2010/main" val="19875243"/>
       </p:ext>
     </p:extLst>
   </p:cSld>
   <p:clrMapOvr>
     <a:masterClrMapping/>
   </p:clrMapOvr>
+  <p:timing>
+    <p:tnLst>
+      <p:par>
+        <p:cTn id="1" dur="indefinite" restart="never" nodeType="tmRoot"/>
+      </p:par>
+    </p:tnLst>
+  </p:timing>
 </p:sld>
 </file>
 

</xml_diff>